<commit_message>
Continued EDA and plots
</commit_message>
<xml_diff>
--- a/Alec_Schneider_Project 1.pptx
+++ b/Alec_Schneider_Project 1.pptx
@@ -109,6 +109,11 @@
       </a:defRPr>
     </a:lvl9pPr>
   </p:defaultTextStyle>
+  <p:extLst>
+    <p:ext uri="{EFAFB233-063F-42B5-8137-9DF3F51BA10A}">
+      <p15:sldGuideLst xmlns:p15="http://schemas.microsoft.com/office/powerpoint/2012/main"/>
+    </p:ext>
+  </p:extLst>
 </p:presentation>
 </file>
 
@@ -194,7 +199,7 @@
           <a:p>
             <a:fld id="{45AAD2E7-F840-4E20-B532-C1C970F7D991}" type="datetimeFigureOut">
               <a:rPr lang="en-US" smtClean="0"/>
-              <a:t>10/28/2020</a:t>
+              <a:t>11/1/2020</a:t>
             </a:fld>
             <a:endParaRPr lang="en-US"/>
           </a:p>
@@ -629,7 +634,7 @@
           <a:p>
             <a:fld id="{114ACC8B-FBB1-4480-AB9F-197C18AB2855}" type="datetime1">
               <a:rPr lang="en-US" smtClean="0"/>
-              <a:t>10/28/2020</a:t>
+              <a:t>11/1/2020</a:t>
             </a:fld>
             <a:endParaRPr lang="en-US"/>
           </a:p>
@@ -857,7 +862,7 @@
           <a:p>
             <a:fld id="{0D7725AA-B66A-41DC-9162-5EB89763CBA0}" type="datetime1">
               <a:rPr lang="en-US" smtClean="0"/>
-              <a:t>10/28/2020</a:t>
+              <a:t>11/1/2020</a:t>
             </a:fld>
             <a:endParaRPr lang="en-US"/>
           </a:p>
@@ -1037,7 +1042,7 @@
           <a:p>
             <a:fld id="{39BB1234-147E-493A-9356-6870848F3918}" type="datetime1">
               <a:rPr lang="en-US" smtClean="0"/>
-              <a:t>10/28/2020</a:t>
+              <a:t>11/1/2020</a:t>
             </a:fld>
             <a:endParaRPr lang="en-US"/>
           </a:p>
@@ -1207,7 +1212,7 @@
           <a:p>
             <a:fld id="{5ACBCA9F-41DC-4169-97F6-7B2690FF2165}" type="datetime1">
               <a:rPr lang="en-US" smtClean="0"/>
-              <a:t>10/28/2020</a:t>
+              <a:t>11/1/2020</a:t>
             </a:fld>
             <a:endParaRPr lang="en-US"/>
           </a:p>
@@ -1461,7 +1466,7 @@
           <a:p>
             <a:fld id="{7D5A4D84-DC92-42CE-B0D5-86B35B61630E}" type="datetime1">
               <a:rPr lang="en-US" smtClean="0"/>
-              <a:t>10/28/2020</a:t>
+              <a:t>11/1/2020</a:t>
             </a:fld>
             <a:endParaRPr lang="en-US"/>
           </a:p>
@@ -1787,7 +1792,7 @@
           <a:p>
             <a:fld id="{76B1EF4E-E00F-4C31-BCE3-3DCE08B8E990}" type="datetime1">
               <a:rPr lang="en-US" smtClean="0"/>
-              <a:t>10/28/2020</a:t>
+              <a:t>11/1/2020</a:t>
             </a:fld>
             <a:endParaRPr lang="en-US"/>
           </a:p>
@@ -2238,7 +2243,7 @@
           <a:p>
             <a:fld id="{FF9C4FCA-8084-4C87-BB06-F14018F39C14}" type="datetime1">
               <a:rPr lang="en-US" smtClean="0"/>
-              <a:t>10/28/2020</a:t>
+              <a:t>11/1/2020</a:t>
             </a:fld>
             <a:endParaRPr lang="en-US"/>
           </a:p>
@@ -2356,7 +2361,7 @@
           <a:p>
             <a:fld id="{9E2C6853-A366-4430-B1A2-AF4D7472F631}" type="datetime1">
               <a:rPr lang="en-US" smtClean="0"/>
-              <a:t>10/28/2020</a:t>
+              <a:t>11/1/2020</a:t>
             </a:fld>
             <a:endParaRPr lang="en-US"/>
           </a:p>
@@ -2451,7 +2456,7 @@
           <a:p>
             <a:fld id="{A4F20404-375D-4C19-A088-8BE7E64A3CAC}" type="datetime1">
               <a:rPr lang="en-US" smtClean="0"/>
-              <a:t>10/28/2020</a:t>
+              <a:t>11/1/2020</a:t>
             </a:fld>
             <a:endParaRPr lang="en-US"/>
           </a:p>
@@ -2738,7 +2743,7 @@
           <a:p>
             <a:fld id="{AF0B22E8-E871-4A31-BA96-F72588C22763}" type="datetime1">
               <a:rPr lang="en-US" smtClean="0"/>
-              <a:t>10/28/2020</a:t>
+              <a:t>11/1/2020</a:t>
             </a:fld>
             <a:endParaRPr lang="en-US"/>
           </a:p>
@@ -3060,7 +3065,7 @@
           <a:p>
             <a:fld id="{F578B820-8308-48D2-B150-F5EBD63D1D29}" type="datetime1">
               <a:rPr lang="en-US" smtClean="0"/>
-              <a:t>10/28/2020</a:t>
+              <a:t>11/1/2020</a:t>
             </a:fld>
             <a:endParaRPr lang="en-US"/>
           </a:p>
@@ -3314,7 +3319,7 @@
           <a:p>
             <a:fld id="{2C55B290-2D3E-40FD-A731-FD561C401CBD}" type="datetime1">
               <a:rPr lang="en-US" smtClean="0"/>
-              <a:t>10/28/2020</a:t>
+              <a:t>11/1/2020</a:t>
             </a:fld>
             <a:endParaRPr lang="en-US"/>
           </a:p>
@@ -4016,7 +4021,7 @@
             <a:pPr lvl="2"/>
             <a:r>
               <a:rPr lang="en-US" dirty="0"/>
-              <a:t>Created a bar chart of the Satisfaction variable</a:t>
+              <a:t>Created a chart of the Satisfaction variable to visualize the distribution of the scores </a:t>
             </a:r>
           </a:p>
           <a:p>
@@ -4047,7 +4052,7 @@
             <a:pPr lvl="1"/>
             <a:r>
               <a:rPr lang="en-US" dirty="0"/>
-              <a:t>Create buckets of the Age column</a:t>
+              <a:t>Create bins of the Age column</a:t>
             </a:r>
           </a:p>
           <a:p>

</xml_diff>